<commit_message>
updated with sensor object avoidance and all motors working
</commit_message>
<xml_diff>
--- a/Final.pptx
+++ b/Final.pptx
@@ -259,7 +259,7 @@
           <a:p>
             <a:fld id="{4B5BF063-1295-4E75-BF47-6B5A10C04EA7}" type="datetimeFigureOut">
               <a:rPr lang="en-US" smtClean="0"/>
-              <a:t>12/8/2022</a:t>
+              <a:t>12/11/2022</a:t>
             </a:fld>
             <a:endParaRPr lang="en-US"/>
           </a:p>
@@ -457,7 +457,7 @@
           <a:p>
             <a:fld id="{4B5BF063-1295-4E75-BF47-6B5A10C04EA7}" type="datetimeFigureOut">
               <a:rPr lang="en-US" smtClean="0"/>
-              <a:t>12/8/2022</a:t>
+              <a:t>12/11/2022</a:t>
             </a:fld>
             <a:endParaRPr lang="en-US"/>
           </a:p>
@@ -665,7 +665,7 @@
           <a:p>
             <a:fld id="{4B5BF063-1295-4E75-BF47-6B5A10C04EA7}" type="datetimeFigureOut">
               <a:rPr lang="en-US" smtClean="0"/>
-              <a:t>12/8/2022</a:t>
+              <a:t>12/11/2022</a:t>
             </a:fld>
             <a:endParaRPr lang="en-US"/>
           </a:p>
@@ -863,7 +863,7 @@
           <a:p>
             <a:fld id="{4B5BF063-1295-4E75-BF47-6B5A10C04EA7}" type="datetimeFigureOut">
               <a:rPr lang="en-US" smtClean="0"/>
-              <a:t>12/8/2022</a:t>
+              <a:t>12/11/2022</a:t>
             </a:fld>
             <a:endParaRPr lang="en-US"/>
           </a:p>
@@ -1138,7 +1138,7 @@
           <a:p>
             <a:fld id="{4B5BF063-1295-4E75-BF47-6B5A10C04EA7}" type="datetimeFigureOut">
               <a:rPr lang="en-US" smtClean="0"/>
-              <a:t>12/8/2022</a:t>
+              <a:t>12/11/2022</a:t>
             </a:fld>
             <a:endParaRPr lang="en-US"/>
           </a:p>
@@ -1403,7 +1403,7 @@
           <a:p>
             <a:fld id="{4B5BF063-1295-4E75-BF47-6B5A10C04EA7}" type="datetimeFigureOut">
               <a:rPr lang="en-US" smtClean="0"/>
-              <a:t>12/8/2022</a:t>
+              <a:t>12/11/2022</a:t>
             </a:fld>
             <a:endParaRPr lang="en-US"/>
           </a:p>
@@ -1815,7 +1815,7 @@
           <a:p>
             <a:fld id="{4B5BF063-1295-4E75-BF47-6B5A10C04EA7}" type="datetimeFigureOut">
               <a:rPr lang="en-US" smtClean="0"/>
-              <a:t>12/8/2022</a:t>
+              <a:t>12/11/2022</a:t>
             </a:fld>
             <a:endParaRPr lang="en-US"/>
           </a:p>
@@ -1956,7 +1956,7 @@
           <a:p>
             <a:fld id="{4B5BF063-1295-4E75-BF47-6B5A10C04EA7}" type="datetimeFigureOut">
               <a:rPr lang="en-US" smtClean="0"/>
-              <a:t>12/8/2022</a:t>
+              <a:t>12/11/2022</a:t>
             </a:fld>
             <a:endParaRPr lang="en-US"/>
           </a:p>
@@ -2069,7 +2069,7 @@
           <a:p>
             <a:fld id="{4B5BF063-1295-4E75-BF47-6B5A10C04EA7}" type="datetimeFigureOut">
               <a:rPr lang="en-US" smtClean="0"/>
-              <a:t>12/8/2022</a:t>
+              <a:t>12/11/2022</a:t>
             </a:fld>
             <a:endParaRPr lang="en-US"/>
           </a:p>
@@ -2380,7 +2380,7 @@
           <a:p>
             <a:fld id="{4B5BF063-1295-4E75-BF47-6B5A10C04EA7}" type="datetimeFigureOut">
               <a:rPr lang="en-US" smtClean="0"/>
-              <a:t>12/8/2022</a:t>
+              <a:t>12/11/2022</a:t>
             </a:fld>
             <a:endParaRPr lang="en-US"/>
           </a:p>
@@ -2668,7 +2668,7 @@
           <a:p>
             <a:fld id="{4B5BF063-1295-4E75-BF47-6B5A10C04EA7}" type="datetimeFigureOut">
               <a:rPr lang="en-US" smtClean="0"/>
-              <a:t>12/8/2022</a:t>
+              <a:t>12/11/2022</a:t>
             </a:fld>
             <a:endParaRPr lang="en-US"/>
           </a:p>
@@ -2909,7 +2909,7 @@
           <a:p>
             <a:fld id="{4B5BF063-1295-4E75-BF47-6B5A10C04EA7}" type="datetimeFigureOut">
               <a:rPr lang="en-US" smtClean="0"/>
-              <a:t>12/8/2022</a:t>
+              <a:t>12/11/2022</a:t>
             </a:fld>
             <a:endParaRPr lang="en-US"/>
           </a:p>
@@ -4001,7 +4001,7 @@
           </a:prstGeom>
           <a:ln w="57150">
             <a:solidFill>
-              <a:srgbClr val="7030A0"/>
+              <a:srgbClr val="FF0000"/>
             </a:solidFill>
           </a:ln>
         </p:spPr>
@@ -4044,7 +4044,7 @@
           </a:prstGeom>
           <a:ln w="57150">
             <a:solidFill>
-              <a:srgbClr val="7030A0"/>
+              <a:srgbClr val="FF0000"/>
             </a:solidFill>
           </a:ln>
         </p:spPr>
@@ -4087,7 +4087,7 @@
           </a:prstGeom>
           <a:ln w="57150">
             <a:solidFill>
-              <a:srgbClr val="7030A0"/>
+              <a:srgbClr val="FF0000"/>
             </a:solidFill>
           </a:ln>
         </p:spPr>
@@ -4130,7 +4130,7 @@
           </a:prstGeom>
           <a:ln w="57150">
             <a:solidFill>
-              <a:srgbClr val="7030A0"/>
+              <a:srgbClr val="FF0000"/>
             </a:solidFill>
           </a:ln>
         </p:spPr>
@@ -4173,7 +4173,7 @@
           </a:prstGeom>
           <a:ln w="57150">
             <a:solidFill>
-              <a:srgbClr val="7030A0"/>
+              <a:srgbClr val="FF0000"/>
             </a:solidFill>
           </a:ln>
         </p:spPr>
@@ -4216,7 +4216,7 @@
           </a:prstGeom>
           <a:ln w="57150">
             <a:solidFill>
-              <a:schemeClr val="tx1"/>
+              <a:srgbClr val="920000"/>
             </a:solidFill>
           </a:ln>
         </p:spPr>
@@ -4251,51 +4251,8 @@
         </p:nvCxnSpPr>
         <p:spPr>
           <a:xfrm flipH="1" flipV="1">
-            <a:off x="6891869" y="4028344"/>
-            <a:ext cx="1324283" cy="25092"/>
-          </a:xfrm>
-          <a:prstGeom prst="line">
-            <a:avLst/>
-          </a:prstGeom>
-          <a:ln w="57150">
-            <a:solidFill>
-              <a:srgbClr val="FF0000"/>
-            </a:solidFill>
-          </a:ln>
-        </p:spPr>
-        <p:style>
-          <a:lnRef idx="1">
-            <a:schemeClr val="accent1"/>
-          </a:lnRef>
-          <a:fillRef idx="0">
-            <a:schemeClr val="accent1"/>
-          </a:fillRef>
-          <a:effectRef idx="0">
-            <a:schemeClr val="accent1"/>
-          </a:effectRef>
-          <a:fontRef idx="minor">
-            <a:schemeClr val="tx1"/>
-          </a:fontRef>
-        </p:style>
-      </p:cxnSp>
-      <p:cxnSp>
-        <p:nvCxnSpPr>
-          <p:cNvPr id="1048" name="Straight Connector 1047">
-            <a:extLst>
-              <a:ext uri="{FF2B5EF4-FFF2-40B4-BE49-F238E27FC236}">
-                <a16:creationId xmlns:a16="http://schemas.microsoft.com/office/drawing/2014/main" id="{4BAD8288-4A9A-EC21-E756-DCD000D0206D}"/>
-              </a:ext>
-            </a:extLst>
-          </p:cNvPr>
-          <p:cNvCxnSpPr>
-            <a:cxnSpLocks/>
-          </p:cNvCxnSpPr>
-          <p:nvPr/>
-        </p:nvCxnSpPr>
-        <p:spPr>
-          <a:xfrm flipV="1">
-            <a:off x="8194712" y="4040890"/>
-            <a:ext cx="88834" cy="277111"/>
+            <a:off x="8180973" y="4308571"/>
+            <a:ext cx="829474" cy="52269"/>
           </a:xfrm>
           <a:prstGeom prst="line">
             <a:avLst/>

</xml_diff>